<commit_message>
design sent by Benjamin
git-svn-id: http://localhost/svn/project.bloocru@47 ba9d1529-2e74-4a06-b9c6-6400ac57aca1
</commit_message>
<xml_diff>
--- a/web/demo/doc/design.pptx
+++ b/web/demo/doc/design.pptx
@@ -5,13 +5,13 @@
     <p:sldMasterId id="2147483648" r:id="rId1"/>
   </p:sldMasterIdLst>
   <p:sldIdLst>
-    <p:sldId id="256" r:id="rId2"/>
+    <p:sldId id="257" r:id="rId2"/>
   </p:sldIdLst>
   <p:sldSz cx="9144000" cy="6858000" type="screen4x3"/>
   <p:notesSz cx="6858000" cy="9144000"/>
   <p:defaultTextStyle>
     <a:defPPr>
-      <a:defRPr lang="es-CL"/>
+      <a:defRPr lang="es-ES"/>
     </a:defPPr>
     <a:lvl1pPr marL="0" algn="l" defTabSz="914400" rtl="0" eaLnBrk="1" latinLnBrk="0" hangingPunct="1">
       <a:defRPr sz="1800" kern="1200">
@@ -109,7 +109,7 @@
 
 <file path=ppt/slideLayouts/slideLayout1.xml><?xml version="1.0" encoding="utf-8"?>
 <p:sldLayout xmlns:a="http://schemas.openxmlformats.org/drawingml/2006/main" xmlns:r="http://schemas.openxmlformats.org/officeDocument/2006/relationships" xmlns:p="http://schemas.openxmlformats.org/presentationml/2006/main" type="title" preserve="1">
-  <p:cSld name="Title Slide">
+  <p:cSld name="Diapositiva de título">
     <p:spTree>
       <p:nvGrpSpPr>
         <p:cNvPr id="1" name=""/>
@@ -126,7 +126,7 @@
       </p:grpSpPr>
       <p:sp>
         <p:nvSpPr>
-          <p:cNvPr id="2" name="Title 1"/>
+          <p:cNvPr id="2" name="1 Título"/>
           <p:cNvSpPr>
             <a:spLocks noGrp="1"/>
           </p:cNvSpPr>
@@ -145,16 +145,16 @@
           <a:lstStyle/>
           <a:p>
             <a:r>
-              <a:rPr lang="en-US" smtClean="0"/>
-              <a:t>Click to edit Master title style</a:t>
-            </a:r>
-            <a:endParaRPr lang="es-CL"/>
-          </a:p>
-        </p:txBody>
-      </p:sp>
-      <p:sp>
-        <p:nvSpPr>
-          <p:cNvPr id="3" name="Subtitle 2"/>
+              <a:rPr lang="es-ES" smtClean="0"/>
+              <a:t>Haga clic para modificar el estilo de título del patrón</a:t>
+            </a:r>
+            <a:endParaRPr lang="es-ES"/>
+          </a:p>
+        </p:txBody>
+      </p:sp>
+      <p:sp>
+        <p:nvSpPr>
+          <p:cNvPr id="3" name="2 Subtítulo"/>
           <p:cNvSpPr>
             <a:spLocks noGrp="1"/>
           </p:cNvSpPr>
@@ -264,16 +264,16 @@
           </a:lstStyle>
           <a:p>
             <a:r>
-              <a:rPr lang="en-US" smtClean="0"/>
-              <a:t>Click to edit Master subtitle style</a:t>
-            </a:r>
-            <a:endParaRPr lang="es-CL"/>
-          </a:p>
-        </p:txBody>
-      </p:sp>
-      <p:sp>
-        <p:nvSpPr>
-          <p:cNvPr id="4" name="Date Placeholder 3"/>
+              <a:rPr lang="es-ES" smtClean="0"/>
+              <a:t>Haga clic para modificar el estilo de subtítulo del patrón</a:t>
+            </a:r>
+            <a:endParaRPr lang="es-ES"/>
+          </a:p>
+        </p:txBody>
+      </p:sp>
+      <p:sp>
+        <p:nvSpPr>
+          <p:cNvPr id="4" name="3 Marcador de fecha"/>
           <p:cNvSpPr>
             <a:spLocks noGrp="1"/>
           </p:cNvSpPr>
@@ -286,17 +286,17 @@
           <a:bodyPr/>
           <a:lstStyle/>
           <a:p>
-            <a:fld id="{8970EC39-E361-4602-A3A9-40C409064D40}" type="datetimeFigureOut">
-              <a:rPr lang="es-CL" smtClean="0"/>
-              <a:t>14-03-2013</a:t>
+            <a:fld id="{486AC70B-00E8-4BFA-AADE-B3DB6703A030}" type="datetimeFigureOut">
+              <a:rPr lang="es-ES" smtClean="0"/>
+              <a:t>18/03/2013</a:t>
             </a:fld>
-            <a:endParaRPr lang="es-CL"/>
-          </a:p>
-        </p:txBody>
-      </p:sp>
-      <p:sp>
-        <p:nvSpPr>
-          <p:cNvPr id="5" name="Footer Placeholder 4"/>
+            <a:endParaRPr lang="es-ES"/>
+          </a:p>
+        </p:txBody>
+      </p:sp>
+      <p:sp>
+        <p:nvSpPr>
+          <p:cNvPr id="5" name="4 Marcador de pie de página"/>
           <p:cNvSpPr>
             <a:spLocks noGrp="1"/>
           </p:cNvSpPr>
@@ -309,13 +309,13 @@
           <a:bodyPr/>
           <a:lstStyle/>
           <a:p>
-            <a:endParaRPr lang="es-CL"/>
-          </a:p>
-        </p:txBody>
-      </p:sp>
-      <p:sp>
-        <p:nvSpPr>
-          <p:cNvPr id="6" name="Slide Number Placeholder 5"/>
+            <a:endParaRPr lang="es-ES"/>
+          </a:p>
+        </p:txBody>
+      </p:sp>
+      <p:sp>
+        <p:nvSpPr>
+          <p:cNvPr id="6" name="5 Marcador de número de diapositiva"/>
           <p:cNvSpPr>
             <a:spLocks noGrp="1"/>
           </p:cNvSpPr>
@@ -328,11 +328,11 @@
           <a:bodyPr/>
           <a:lstStyle/>
           <a:p>
-            <a:fld id="{01591DC6-E42F-4BA5-A114-12E63EDD4FE9}" type="slidenum">
-              <a:rPr lang="es-CL" smtClean="0"/>
-              <a:t>‹#›</a:t>
+            <a:fld id="{DED4FB0F-F7DE-47F7-8715-EE2F371FAFB0}" type="slidenum">
+              <a:rPr lang="es-ES" smtClean="0"/>
+              <a:t>‹Nº›</a:t>
             </a:fld>
-            <a:endParaRPr lang="es-CL"/>
+            <a:endParaRPr lang="es-ES"/>
           </a:p>
         </p:txBody>
       </p:sp>
@@ -346,7 +346,7 @@
 
 <file path=ppt/slideLayouts/slideLayout10.xml><?xml version="1.0" encoding="utf-8"?>
 <p:sldLayout xmlns:a="http://schemas.openxmlformats.org/drawingml/2006/main" xmlns:r="http://schemas.openxmlformats.org/officeDocument/2006/relationships" xmlns:p="http://schemas.openxmlformats.org/presentationml/2006/main" type="vertTx" preserve="1">
-  <p:cSld name="Title and Vertical Text">
+  <p:cSld name="Título y texto vertical">
     <p:spTree>
       <p:nvGrpSpPr>
         <p:cNvPr id="1" name=""/>
@@ -363,7 +363,7 @@
       </p:grpSpPr>
       <p:sp>
         <p:nvSpPr>
-          <p:cNvPr id="2" name="Title 1"/>
+          <p:cNvPr id="2" name="1 Título"/>
           <p:cNvSpPr>
             <a:spLocks noGrp="1"/>
           </p:cNvSpPr>
@@ -377,16 +377,16 @@
           <a:lstStyle/>
           <a:p>
             <a:r>
-              <a:rPr lang="en-US" smtClean="0"/>
-              <a:t>Click to edit Master title style</a:t>
-            </a:r>
-            <a:endParaRPr lang="es-CL"/>
-          </a:p>
-        </p:txBody>
-      </p:sp>
-      <p:sp>
-        <p:nvSpPr>
-          <p:cNvPr id="3" name="Vertical Text Placeholder 2"/>
+              <a:rPr lang="es-ES" smtClean="0"/>
+              <a:t>Haga clic para modificar el estilo de título del patrón</a:t>
+            </a:r>
+            <a:endParaRPr lang="es-ES"/>
+          </a:p>
+        </p:txBody>
+      </p:sp>
+      <p:sp>
+        <p:nvSpPr>
+          <p:cNvPr id="3" name="2 Marcador de texto vertical"/>
           <p:cNvSpPr>
             <a:spLocks noGrp="1"/>
           </p:cNvSpPr>
@@ -401,44 +401,44 @@
           <a:p>
             <a:pPr lvl="0"/>
             <a:r>
-              <a:rPr lang="en-US" smtClean="0"/>
-              <a:t>Click to edit Master text styles</a:t>
+              <a:rPr lang="es-ES" smtClean="0"/>
+              <a:t>Haga clic para modificar el estilo de texto del patrón</a:t>
             </a:r>
           </a:p>
           <a:p>
             <a:pPr lvl="1"/>
             <a:r>
-              <a:rPr lang="en-US" smtClean="0"/>
-              <a:t>Second level</a:t>
+              <a:rPr lang="es-ES" smtClean="0"/>
+              <a:t>Segundo nivel</a:t>
             </a:r>
           </a:p>
           <a:p>
             <a:pPr lvl="2"/>
             <a:r>
-              <a:rPr lang="en-US" smtClean="0"/>
-              <a:t>Third level</a:t>
+              <a:rPr lang="es-ES" smtClean="0"/>
+              <a:t>Tercer nivel</a:t>
             </a:r>
           </a:p>
           <a:p>
             <a:pPr lvl="3"/>
             <a:r>
-              <a:rPr lang="en-US" smtClean="0"/>
-              <a:t>Fourth level</a:t>
+              <a:rPr lang="es-ES" smtClean="0"/>
+              <a:t>Cuarto nivel</a:t>
             </a:r>
           </a:p>
           <a:p>
             <a:pPr lvl="4"/>
             <a:r>
-              <a:rPr lang="en-US" smtClean="0"/>
-              <a:t>Fifth level</a:t>
-            </a:r>
-            <a:endParaRPr lang="es-CL"/>
-          </a:p>
-        </p:txBody>
-      </p:sp>
-      <p:sp>
-        <p:nvSpPr>
-          <p:cNvPr id="4" name="Date Placeholder 3"/>
+              <a:rPr lang="es-ES" smtClean="0"/>
+              <a:t>Quinto nivel</a:t>
+            </a:r>
+            <a:endParaRPr lang="es-ES"/>
+          </a:p>
+        </p:txBody>
+      </p:sp>
+      <p:sp>
+        <p:nvSpPr>
+          <p:cNvPr id="4" name="3 Marcador de fecha"/>
           <p:cNvSpPr>
             <a:spLocks noGrp="1"/>
           </p:cNvSpPr>
@@ -451,17 +451,17 @@
           <a:bodyPr/>
           <a:lstStyle/>
           <a:p>
-            <a:fld id="{8970EC39-E361-4602-A3A9-40C409064D40}" type="datetimeFigureOut">
-              <a:rPr lang="es-CL" smtClean="0"/>
-              <a:t>14-03-2013</a:t>
+            <a:fld id="{486AC70B-00E8-4BFA-AADE-B3DB6703A030}" type="datetimeFigureOut">
+              <a:rPr lang="es-ES" smtClean="0"/>
+              <a:t>18/03/2013</a:t>
             </a:fld>
-            <a:endParaRPr lang="es-CL"/>
-          </a:p>
-        </p:txBody>
-      </p:sp>
-      <p:sp>
-        <p:nvSpPr>
-          <p:cNvPr id="5" name="Footer Placeholder 4"/>
+            <a:endParaRPr lang="es-ES"/>
+          </a:p>
+        </p:txBody>
+      </p:sp>
+      <p:sp>
+        <p:nvSpPr>
+          <p:cNvPr id="5" name="4 Marcador de pie de página"/>
           <p:cNvSpPr>
             <a:spLocks noGrp="1"/>
           </p:cNvSpPr>
@@ -474,13 +474,13 @@
           <a:bodyPr/>
           <a:lstStyle/>
           <a:p>
-            <a:endParaRPr lang="es-CL"/>
-          </a:p>
-        </p:txBody>
-      </p:sp>
-      <p:sp>
-        <p:nvSpPr>
-          <p:cNvPr id="6" name="Slide Number Placeholder 5"/>
+            <a:endParaRPr lang="es-ES"/>
+          </a:p>
+        </p:txBody>
+      </p:sp>
+      <p:sp>
+        <p:nvSpPr>
+          <p:cNvPr id="6" name="5 Marcador de número de diapositiva"/>
           <p:cNvSpPr>
             <a:spLocks noGrp="1"/>
           </p:cNvSpPr>
@@ -493,11 +493,11 @@
           <a:bodyPr/>
           <a:lstStyle/>
           <a:p>
-            <a:fld id="{01591DC6-E42F-4BA5-A114-12E63EDD4FE9}" type="slidenum">
-              <a:rPr lang="es-CL" smtClean="0"/>
-              <a:t>‹#›</a:t>
+            <a:fld id="{DED4FB0F-F7DE-47F7-8715-EE2F371FAFB0}" type="slidenum">
+              <a:rPr lang="es-ES" smtClean="0"/>
+              <a:t>‹Nº›</a:t>
             </a:fld>
-            <a:endParaRPr lang="es-CL"/>
+            <a:endParaRPr lang="es-ES"/>
           </a:p>
         </p:txBody>
       </p:sp>
@@ -511,7 +511,7 @@
 
 <file path=ppt/slideLayouts/slideLayout11.xml><?xml version="1.0" encoding="utf-8"?>
 <p:sldLayout xmlns:a="http://schemas.openxmlformats.org/drawingml/2006/main" xmlns:r="http://schemas.openxmlformats.org/officeDocument/2006/relationships" xmlns:p="http://schemas.openxmlformats.org/presentationml/2006/main" type="vertTitleAndTx" preserve="1">
-  <p:cSld name="Vertical Title and Text">
+  <p:cSld name="Título vertical y texto">
     <p:spTree>
       <p:nvGrpSpPr>
         <p:cNvPr id="1" name=""/>
@@ -528,7 +528,7 @@
       </p:grpSpPr>
       <p:sp>
         <p:nvSpPr>
-          <p:cNvPr id="2" name="Vertical Title 1"/>
+          <p:cNvPr id="2" name="1 Título vertical"/>
           <p:cNvSpPr>
             <a:spLocks noGrp="1"/>
           </p:cNvSpPr>
@@ -547,16 +547,16 @@
           <a:lstStyle/>
           <a:p>
             <a:r>
-              <a:rPr lang="en-US" smtClean="0"/>
-              <a:t>Click to edit Master title style</a:t>
-            </a:r>
-            <a:endParaRPr lang="es-CL"/>
-          </a:p>
-        </p:txBody>
-      </p:sp>
-      <p:sp>
-        <p:nvSpPr>
-          <p:cNvPr id="3" name="Vertical Text Placeholder 2"/>
+              <a:rPr lang="es-ES" smtClean="0"/>
+              <a:t>Haga clic para modificar el estilo de título del patrón</a:t>
+            </a:r>
+            <a:endParaRPr lang="es-ES"/>
+          </a:p>
+        </p:txBody>
+      </p:sp>
+      <p:sp>
+        <p:nvSpPr>
+          <p:cNvPr id="3" name="2 Marcador de texto vertical"/>
           <p:cNvSpPr>
             <a:spLocks noGrp="1"/>
           </p:cNvSpPr>
@@ -576,44 +576,44 @@
           <a:p>
             <a:pPr lvl="0"/>
             <a:r>
-              <a:rPr lang="en-US" smtClean="0"/>
-              <a:t>Click to edit Master text styles</a:t>
+              <a:rPr lang="es-ES" smtClean="0"/>
+              <a:t>Haga clic para modificar el estilo de texto del patrón</a:t>
             </a:r>
           </a:p>
           <a:p>
             <a:pPr lvl="1"/>
             <a:r>
-              <a:rPr lang="en-US" smtClean="0"/>
-              <a:t>Second level</a:t>
+              <a:rPr lang="es-ES" smtClean="0"/>
+              <a:t>Segundo nivel</a:t>
             </a:r>
           </a:p>
           <a:p>
             <a:pPr lvl="2"/>
             <a:r>
-              <a:rPr lang="en-US" smtClean="0"/>
-              <a:t>Third level</a:t>
+              <a:rPr lang="es-ES" smtClean="0"/>
+              <a:t>Tercer nivel</a:t>
             </a:r>
           </a:p>
           <a:p>
             <a:pPr lvl="3"/>
             <a:r>
-              <a:rPr lang="en-US" smtClean="0"/>
-              <a:t>Fourth level</a:t>
+              <a:rPr lang="es-ES" smtClean="0"/>
+              <a:t>Cuarto nivel</a:t>
             </a:r>
           </a:p>
           <a:p>
             <a:pPr lvl="4"/>
             <a:r>
-              <a:rPr lang="en-US" smtClean="0"/>
-              <a:t>Fifth level</a:t>
-            </a:r>
-            <a:endParaRPr lang="es-CL"/>
-          </a:p>
-        </p:txBody>
-      </p:sp>
-      <p:sp>
-        <p:nvSpPr>
-          <p:cNvPr id="4" name="Date Placeholder 3"/>
+              <a:rPr lang="es-ES" smtClean="0"/>
+              <a:t>Quinto nivel</a:t>
+            </a:r>
+            <a:endParaRPr lang="es-ES"/>
+          </a:p>
+        </p:txBody>
+      </p:sp>
+      <p:sp>
+        <p:nvSpPr>
+          <p:cNvPr id="4" name="3 Marcador de fecha"/>
           <p:cNvSpPr>
             <a:spLocks noGrp="1"/>
           </p:cNvSpPr>
@@ -626,17 +626,17 @@
           <a:bodyPr/>
           <a:lstStyle/>
           <a:p>
-            <a:fld id="{8970EC39-E361-4602-A3A9-40C409064D40}" type="datetimeFigureOut">
-              <a:rPr lang="es-CL" smtClean="0"/>
-              <a:t>14-03-2013</a:t>
+            <a:fld id="{486AC70B-00E8-4BFA-AADE-B3DB6703A030}" type="datetimeFigureOut">
+              <a:rPr lang="es-ES" smtClean="0"/>
+              <a:t>18/03/2013</a:t>
             </a:fld>
-            <a:endParaRPr lang="es-CL"/>
-          </a:p>
-        </p:txBody>
-      </p:sp>
-      <p:sp>
-        <p:nvSpPr>
-          <p:cNvPr id="5" name="Footer Placeholder 4"/>
+            <a:endParaRPr lang="es-ES"/>
+          </a:p>
+        </p:txBody>
+      </p:sp>
+      <p:sp>
+        <p:nvSpPr>
+          <p:cNvPr id="5" name="4 Marcador de pie de página"/>
           <p:cNvSpPr>
             <a:spLocks noGrp="1"/>
           </p:cNvSpPr>
@@ -649,13 +649,13 @@
           <a:bodyPr/>
           <a:lstStyle/>
           <a:p>
-            <a:endParaRPr lang="es-CL"/>
-          </a:p>
-        </p:txBody>
-      </p:sp>
-      <p:sp>
-        <p:nvSpPr>
-          <p:cNvPr id="6" name="Slide Number Placeholder 5"/>
+            <a:endParaRPr lang="es-ES"/>
+          </a:p>
+        </p:txBody>
+      </p:sp>
+      <p:sp>
+        <p:nvSpPr>
+          <p:cNvPr id="6" name="5 Marcador de número de diapositiva"/>
           <p:cNvSpPr>
             <a:spLocks noGrp="1"/>
           </p:cNvSpPr>
@@ -668,11 +668,11 @@
           <a:bodyPr/>
           <a:lstStyle/>
           <a:p>
-            <a:fld id="{01591DC6-E42F-4BA5-A114-12E63EDD4FE9}" type="slidenum">
-              <a:rPr lang="es-CL" smtClean="0"/>
-              <a:t>‹#›</a:t>
+            <a:fld id="{DED4FB0F-F7DE-47F7-8715-EE2F371FAFB0}" type="slidenum">
+              <a:rPr lang="es-ES" smtClean="0"/>
+              <a:t>‹Nº›</a:t>
             </a:fld>
-            <a:endParaRPr lang="es-CL"/>
+            <a:endParaRPr lang="es-ES"/>
           </a:p>
         </p:txBody>
       </p:sp>
@@ -686,7 +686,7 @@
 
 <file path=ppt/slideLayouts/slideLayout2.xml><?xml version="1.0" encoding="utf-8"?>
 <p:sldLayout xmlns:a="http://schemas.openxmlformats.org/drawingml/2006/main" xmlns:r="http://schemas.openxmlformats.org/officeDocument/2006/relationships" xmlns:p="http://schemas.openxmlformats.org/presentationml/2006/main" type="obj" preserve="1">
-  <p:cSld name="Title and Content">
+  <p:cSld name="Título y objetos">
     <p:spTree>
       <p:nvGrpSpPr>
         <p:cNvPr id="1" name=""/>
@@ -703,7 +703,7 @@
       </p:grpSpPr>
       <p:sp>
         <p:nvSpPr>
-          <p:cNvPr id="2" name="Title 1"/>
+          <p:cNvPr id="2" name="1 Título"/>
           <p:cNvSpPr>
             <a:spLocks noGrp="1"/>
           </p:cNvSpPr>
@@ -717,16 +717,16 @@
           <a:lstStyle/>
           <a:p>
             <a:r>
-              <a:rPr lang="en-US" smtClean="0"/>
-              <a:t>Click to edit Master title style</a:t>
-            </a:r>
-            <a:endParaRPr lang="es-CL"/>
-          </a:p>
-        </p:txBody>
-      </p:sp>
-      <p:sp>
-        <p:nvSpPr>
-          <p:cNvPr id="3" name="Content Placeholder 2"/>
+              <a:rPr lang="es-ES" smtClean="0"/>
+              <a:t>Haga clic para modificar el estilo de título del patrón</a:t>
+            </a:r>
+            <a:endParaRPr lang="es-ES"/>
+          </a:p>
+        </p:txBody>
+      </p:sp>
+      <p:sp>
+        <p:nvSpPr>
+          <p:cNvPr id="3" name="2 Marcador de contenido"/>
           <p:cNvSpPr>
             <a:spLocks noGrp="1"/>
           </p:cNvSpPr>
@@ -741,44 +741,44 @@
           <a:p>
             <a:pPr lvl="0"/>
             <a:r>
-              <a:rPr lang="en-US" smtClean="0"/>
-              <a:t>Click to edit Master text styles</a:t>
+              <a:rPr lang="es-ES" smtClean="0"/>
+              <a:t>Haga clic para modificar el estilo de texto del patrón</a:t>
             </a:r>
           </a:p>
           <a:p>
             <a:pPr lvl="1"/>
             <a:r>
-              <a:rPr lang="en-US" smtClean="0"/>
-              <a:t>Second level</a:t>
+              <a:rPr lang="es-ES" smtClean="0"/>
+              <a:t>Segundo nivel</a:t>
             </a:r>
           </a:p>
           <a:p>
             <a:pPr lvl="2"/>
             <a:r>
-              <a:rPr lang="en-US" smtClean="0"/>
-              <a:t>Third level</a:t>
+              <a:rPr lang="es-ES" smtClean="0"/>
+              <a:t>Tercer nivel</a:t>
             </a:r>
           </a:p>
           <a:p>
             <a:pPr lvl="3"/>
             <a:r>
-              <a:rPr lang="en-US" smtClean="0"/>
-              <a:t>Fourth level</a:t>
+              <a:rPr lang="es-ES" smtClean="0"/>
+              <a:t>Cuarto nivel</a:t>
             </a:r>
           </a:p>
           <a:p>
             <a:pPr lvl="4"/>
             <a:r>
-              <a:rPr lang="en-US" smtClean="0"/>
-              <a:t>Fifth level</a:t>
-            </a:r>
-            <a:endParaRPr lang="es-CL"/>
-          </a:p>
-        </p:txBody>
-      </p:sp>
-      <p:sp>
-        <p:nvSpPr>
-          <p:cNvPr id="4" name="Date Placeholder 3"/>
+              <a:rPr lang="es-ES" smtClean="0"/>
+              <a:t>Quinto nivel</a:t>
+            </a:r>
+            <a:endParaRPr lang="es-ES"/>
+          </a:p>
+        </p:txBody>
+      </p:sp>
+      <p:sp>
+        <p:nvSpPr>
+          <p:cNvPr id="4" name="3 Marcador de fecha"/>
           <p:cNvSpPr>
             <a:spLocks noGrp="1"/>
           </p:cNvSpPr>
@@ -791,17 +791,17 @@
           <a:bodyPr/>
           <a:lstStyle/>
           <a:p>
-            <a:fld id="{8970EC39-E361-4602-A3A9-40C409064D40}" type="datetimeFigureOut">
-              <a:rPr lang="es-CL" smtClean="0"/>
-              <a:t>14-03-2013</a:t>
+            <a:fld id="{486AC70B-00E8-4BFA-AADE-B3DB6703A030}" type="datetimeFigureOut">
+              <a:rPr lang="es-ES" smtClean="0"/>
+              <a:t>18/03/2013</a:t>
             </a:fld>
-            <a:endParaRPr lang="es-CL"/>
-          </a:p>
-        </p:txBody>
-      </p:sp>
-      <p:sp>
-        <p:nvSpPr>
-          <p:cNvPr id="5" name="Footer Placeholder 4"/>
+            <a:endParaRPr lang="es-ES"/>
+          </a:p>
+        </p:txBody>
+      </p:sp>
+      <p:sp>
+        <p:nvSpPr>
+          <p:cNvPr id="5" name="4 Marcador de pie de página"/>
           <p:cNvSpPr>
             <a:spLocks noGrp="1"/>
           </p:cNvSpPr>
@@ -814,13 +814,13 @@
           <a:bodyPr/>
           <a:lstStyle/>
           <a:p>
-            <a:endParaRPr lang="es-CL"/>
-          </a:p>
-        </p:txBody>
-      </p:sp>
-      <p:sp>
-        <p:nvSpPr>
-          <p:cNvPr id="6" name="Slide Number Placeholder 5"/>
+            <a:endParaRPr lang="es-ES"/>
+          </a:p>
+        </p:txBody>
+      </p:sp>
+      <p:sp>
+        <p:nvSpPr>
+          <p:cNvPr id="6" name="5 Marcador de número de diapositiva"/>
           <p:cNvSpPr>
             <a:spLocks noGrp="1"/>
           </p:cNvSpPr>
@@ -833,11 +833,11 @@
           <a:bodyPr/>
           <a:lstStyle/>
           <a:p>
-            <a:fld id="{01591DC6-E42F-4BA5-A114-12E63EDD4FE9}" type="slidenum">
-              <a:rPr lang="es-CL" smtClean="0"/>
-              <a:t>‹#›</a:t>
+            <a:fld id="{DED4FB0F-F7DE-47F7-8715-EE2F371FAFB0}" type="slidenum">
+              <a:rPr lang="es-ES" smtClean="0"/>
+              <a:t>‹Nº›</a:t>
             </a:fld>
-            <a:endParaRPr lang="es-CL"/>
+            <a:endParaRPr lang="es-ES"/>
           </a:p>
         </p:txBody>
       </p:sp>
@@ -851,7 +851,7 @@
 
 <file path=ppt/slideLayouts/slideLayout3.xml><?xml version="1.0" encoding="utf-8"?>
 <p:sldLayout xmlns:a="http://schemas.openxmlformats.org/drawingml/2006/main" xmlns:r="http://schemas.openxmlformats.org/officeDocument/2006/relationships" xmlns:p="http://schemas.openxmlformats.org/presentationml/2006/main" type="secHead" preserve="1">
-  <p:cSld name="Section Header">
+  <p:cSld name="Encabezado de sección">
     <p:spTree>
       <p:nvGrpSpPr>
         <p:cNvPr id="1" name=""/>
@@ -868,7 +868,7 @@
       </p:grpSpPr>
       <p:sp>
         <p:nvSpPr>
-          <p:cNvPr id="2" name="Title 1"/>
+          <p:cNvPr id="2" name="1 Título"/>
           <p:cNvSpPr>
             <a:spLocks noGrp="1"/>
           </p:cNvSpPr>
@@ -891,16 +891,16 @@
           </a:lstStyle>
           <a:p>
             <a:r>
-              <a:rPr lang="en-US" smtClean="0"/>
-              <a:t>Click to edit Master title style</a:t>
-            </a:r>
-            <a:endParaRPr lang="es-CL"/>
-          </a:p>
-        </p:txBody>
-      </p:sp>
-      <p:sp>
-        <p:nvSpPr>
-          <p:cNvPr id="3" name="Text Placeholder 2"/>
+              <a:rPr lang="es-ES" smtClean="0"/>
+              <a:t>Haga clic para modificar el estilo de título del patrón</a:t>
+            </a:r>
+            <a:endParaRPr lang="es-ES"/>
+          </a:p>
+        </p:txBody>
+      </p:sp>
+      <p:sp>
+        <p:nvSpPr>
+          <p:cNvPr id="3" name="2 Marcador de texto"/>
           <p:cNvSpPr>
             <a:spLocks noGrp="1"/>
           </p:cNvSpPr>
@@ -1011,15 +1011,15 @@
           <a:p>
             <a:pPr lvl="0"/>
             <a:r>
-              <a:rPr lang="en-US" smtClean="0"/>
-              <a:t>Click to edit Master text styles</a:t>
-            </a:r>
-          </a:p>
-        </p:txBody>
-      </p:sp>
-      <p:sp>
-        <p:nvSpPr>
-          <p:cNvPr id="4" name="Date Placeholder 3"/>
+              <a:rPr lang="es-ES" smtClean="0"/>
+              <a:t>Haga clic para modificar el estilo de texto del patrón</a:t>
+            </a:r>
+          </a:p>
+        </p:txBody>
+      </p:sp>
+      <p:sp>
+        <p:nvSpPr>
+          <p:cNvPr id="4" name="3 Marcador de fecha"/>
           <p:cNvSpPr>
             <a:spLocks noGrp="1"/>
           </p:cNvSpPr>
@@ -1032,17 +1032,17 @@
           <a:bodyPr/>
           <a:lstStyle/>
           <a:p>
-            <a:fld id="{8970EC39-E361-4602-A3A9-40C409064D40}" type="datetimeFigureOut">
-              <a:rPr lang="es-CL" smtClean="0"/>
-              <a:t>14-03-2013</a:t>
+            <a:fld id="{486AC70B-00E8-4BFA-AADE-B3DB6703A030}" type="datetimeFigureOut">
+              <a:rPr lang="es-ES" smtClean="0"/>
+              <a:t>18/03/2013</a:t>
             </a:fld>
-            <a:endParaRPr lang="es-CL"/>
-          </a:p>
-        </p:txBody>
-      </p:sp>
-      <p:sp>
-        <p:nvSpPr>
-          <p:cNvPr id="5" name="Footer Placeholder 4"/>
+            <a:endParaRPr lang="es-ES"/>
+          </a:p>
+        </p:txBody>
+      </p:sp>
+      <p:sp>
+        <p:nvSpPr>
+          <p:cNvPr id="5" name="4 Marcador de pie de página"/>
           <p:cNvSpPr>
             <a:spLocks noGrp="1"/>
           </p:cNvSpPr>
@@ -1055,13 +1055,13 @@
           <a:bodyPr/>
           <a:lstStyle/>
           <a:p>
-            <a:endParaRPr lang="es-CL"/>
-          </a:p>
-        </p:txBody>
-      </p:sp>
-      <p:sp>
-        <p:nvSpPr>
-          <p:cNvPr id="6" name="Slide Number Placeholder 5"/>
+            <a:endParaRPr lang="es-ES"/>
+          </a:p>
+        </p:txBody>
+      </p:sp>
+      <p:sp>
+        <p:nvSpPr>
+          <p:cNvPr id="6" name="5 Marcador de número de diapositiva"/>
           <p:cNvSpPr>
             <a:spLocks noGrp="1"/>
           </p:cNvSpPr>
@@ -1074,11 +1074,11 @@
           <a:bodyPr/>
           <a:lstStyle/>
           <a:p>
-            <a:fld id="{01591DC6-E42F-4BA5-A114-12E63EDD4FE9}" type="slidenum">
-              <a:rPr lang="es-CL" smtClean="0"/>
-              <a:t>‹#›</a:t>
+            <a:fld id="{DED4FB0F-F7DE-47F7-8715-EE2F371FAFB0}" type="slidenum">
+              <a:rPr lang="es-ES" smtClean="0"/>
+              <a:t>‹Nº›</a:t>
             </a:fld>
-            <a:endParaRPr lang="es-CL"/>
+            <a:endParaRPr lang="es-ES"/>
           </a:p>
         </p:txBody>
       </p:sp>
@@ -1092,7 +1092,7 @@
 
 <file path=ppt/slideLayouts/slideLayout4.xml><?xml version="1.0" encoding="utf-8"?>
 <p:sldLayout xmlns:a="http://schemas.openxmlformats.org/drawingml/2006/main" xmlns:r="http://schemas.openxmlformats.org/officeDocument/2006/relationships" xmlns:p="http://schemas.openxmlformats.org/presentationml/2006/main" type="twoObj" preserve="1">
-  <p:cSld name="Two Content">
+  <p:cSld name="Dos objetos">
     <p:spTree>
       <p:nvGrpSpPr>
         <p:cNvPr id="1" name=""/>
@@ -1109,7 +1109,7 @@
       </p:grpSpPr>
       <p:sp>
         <p:nvSpPr>
-          <p:cNvPr id="2" name="Title 1"/>
+          <p:cNvPr id="2" name="1 Título"/>
           <p:cNvSpPr>
             <a:spLocks noGrp="1"/>
           </p:cNvSpPr>
@@ -1123,16 +1123,16 @@
           <a:lstStyle/>
           <a:p>
             <a:r>
-              <a:rPr lang="en-US" smtClean="0"/>
-              <a:t>Click to edit Master title style</a:t>
-            </a:r>
-            <a:endParaRPr lang="es-CL"/>
-          </a:p>
-        </p:txBody>
-      </p:sp>
-      <p:sp>
-        <p:nvSpPr>
-          <p:cNvPr id="3" name="Content Placeholder 2"/>
+              <a:rPr lang="es-ES" smtClean="0"/>
+              <a:t>Haga clic para modificar el estilo de título del patrón</a:t>
+            </a:r>
+            <a:endParaRPr lang="es-ES"/>
+          </a:p>
+        </p:txBody>
+      </p:sp>
+      <p:sp>
+        <p:nvSpPr>
+          <p:cNvPr id="3" name="2 Marcador de contenido"/>
           <p:cNvSpPr>
             <a:spLocks noGrp="1"/>
           </p:cNvSpPr>
@@ -1180,44 +1180,44 @@
           <a:p>
             <a:pPr lvl="0"/>
             <a:r>
-              <a:rPr lang="en-US" smtClean="0"/>
-              <a:t>Click to edit Master text styles</a:t>
+              <a:rPr lang="es-ES" smtClean="0"/>
+              <a:t>Haga clic para modificar el estilo de texto del patrón</a:t>
             </a:r>
           </a:p>
           <a:p>
             <a:pPr lvl="1"/>
             <a:r>
-              <a:rPr lang="en-US" smtClean="0"/>
-              <a:t>Second level</a:t>
+              <a:rPr lang="es-ES" smtClean="0"/>
+              <a:t>Segundo nivel</a:t>
             </a:r>
           </a:p>
           <a:p>
             <a:pPr lvl="2"/>
             <a:r>
-              <a:rPr lang="en-US" smtClean="0"/>
-              <a:t>Third level</a:t>
+              <a:rPr lang="es-ES" smtClean="0"/>
+              <a:t>Tercer nivel</a:t>
             </a:r>
           </a:p>
           <a:p>
             <a:pPr lvl="3"/>
             <a:r>
-              <a:rPr lang="en-US" smtClean="0"/>
-              <a:t>Fourth level</a:t>
+              <a:rPr lang="es-ES" smtClean="0"/>
+              <a:t>Cuarto nivel</a:t>
             </a:r>
           </a:p>
           <a:p>
             <a:pPr lvl="4"/>
             <a:r>
-              <a:rPr lang="en-US" smtClean="0"/>
-              <a:t>Fifth level</a:t>
-            </a:r>
-            <a:endParaRPr lang="es-CL"/>
-          </a:p>
-        </p:txBody>
-      </p:sp>
-      <p:sp>
-        <p:nvSpPr>
-          <p:cNvPr id="4" name="Content Placeholder 3"/>
+              <a:rPr lang="es-ES" smtClean="0"/>
+              <a:t>Quinto nivel</a:t>
+            </a:r>
+            <a:endParaRPr lang="es-ES"/>
+          </a:p>
+        </p:txBody>
+      </p:sp>
+      <p:sp>
+        <p:nvSpPr>
+          <p:cNvPr id="4" name="3 Marcador de contenido"/>
           <p:cNvSpPr>
             <a:spLocks noGrp="1"/>
           </p:cNvSpPr>
@@ -1265,44 +1265,44 @@
           <a:p>
             <a:pPr lvl="0"/>
             <a:r>
-              <a:rPr lang="en-US" smtClean="0"/>
-              <a:t>Click to edit Master text styles</a:t>
+              <a:rPr lang="es-ES" smtClean="0"/>
+              <a:t>Haga clic para modificar el estilo de texto del patrón</a:t>
             </a:r>
           </a:p>
           <a:p>
             <a:pPr lvl="1"/>
             <a:r>
-              <a:rPr lang="en-US" smtClean="0"/>
-              <a:t>Second level</a:t>
+              <a:rPr lang="es-ES" smtClean="0"/>
+              <a:t>Segundo nivel</a:t>
             </a:r>
           </a:p>
           <a:p>
             <a:pPr lvl="2"/>
             <a:r>
-              <a:rPr lang="en-US" smtClean="0"/>
-              <a:t>Third level</a:t>
+              <a:rPr lang="es-ES" smtClean="0"/>
+              <a:t>Tercer nivel</a:t>
             </a:r>
           </a:p>
           <a:p>
             <a:pPr lvl="3"/>
             <a:r>
-              <a:rPr lang="en-US" smtClean="0"/>
-              <a:t>Fourth level</a:t>
+              <a:rPr lang="es-ES" smtClean="0"/>
+              <a:t>Cuarto nivel</a:t>
             </a:r>
           </a:p>
           <a:p>
             <a:pPr lvl="4"/>
             <a:r>
-              <a:rPr lang="en-US" smtClean="0"/>
-              <a:t>Fifth level</a:t>
-            </a:r>
-            <a:endParaRPr lang="es-CL"/>
-          </a:p>
-        </p:txBody>
-      </p:sp>
-      <p:sp>
-        <p:nvSpPr>
-          <p:cNvPr id="5" name="Date Placeholder 4"/>
+              <a:rPr lang="es-ES" smtClean="0"/>
+              <a:t>Quinto nivel</a:t>
+            </a:r>
+            <a:endParaRPr lang="es-ES"/>
+          </a:p>
+        </p:txBody>
+      </p:sp>
+      <p:sp>
+        <p:nvSpPr>
+          <p:cNvPr id="5" name="4 Marcador de fecha"/>
           <p:cNvSpPr>
             <a:spLocks noGrp="1"/>
           </p:cNvSpPr>
@@ -1315,17 +1315,17 @@
           <a:bodyPr/>
           <a:lstStyle/>
           <a:p>
-            <a:fld id="{8970EC39-E361-4602-A3A9-40C409064D40}" type="datetimeFigureOut">
-              <a:rPr lang="es-CL" smtClean="0"/>
-              <a:t>14-03-2013</a:t>
+            <a:fld id="{486AC70B-00E8-4BFA-AADE-B3DB6703A030}" type="datetimeFigureOut">
+              <a:rPr lang="es-ES" smtClean="0"/>
+              <a:t>18/03/2013</a:t>
             </a:fld>
-            <a:endParaRPr lang="es-CL"/>
-          </a:p>
-        </p:txBody>
-      </p:sp>
-      <p:sp>
-        <p:nvSpPr>
-          <p:cNvPr id="6" name="Footer Placeholder 5"/>
+            <a:endParaRPr lang="es-ES"/>
+          </a:p>
+        </p:txBody>
+      </p:sp>
+      <p:sp>
+        <p:nvSpPr>
+          <p:cNvPr id="6" name="5 Marcador de pie de página"/>
           <p:cNvSpPr>
             <a:spLocks noGrp="1"/>
           </p:cNvSpPr>
@@ -1338,13 +1338,13 @@
           <a:bodyPr/>
           <a:lstStyle/>
           <a:p>
-            <a:endParaRPr lang="es-CL"/>
-          </a:p>
-        </p:txBody>
-      </p:sp>
-      <p:sp>
-        <p:nvSpPr>
-          <p:cNvPr id="7" name="Slide Number Placeholder 6"/>
+            <a:endParaRPr lang="es-ES"/>
+          </a:p>
+        </p:txBody>
+      </p:sp>
+      <p:sp>
+        <p:nvSpPr>
+          <p:cNvPr id="7" name="6 Marcador de número de diapositiva"/>
           <p:cNvSpPr>
             <a:spLocks noGrp="1"/>
           </p:cNvSpPr>
@@ -1357,11 +1357,11 @@
           <a:bodyPr/>
           <a:lstStyle/>
           <a:p>
-            <a:fld id="{01591DC6-E42F-4BA5-A114-12E63EDD4FE9}" type="slidenum">
-              <a:rPr lang="es-CL" smtClean="0"/>
-              <a:t>‹#›</a:t>
+            <a:fld id="{DED4FB0F-F7DE-47F7-8715-EE2F371FAFB0}" type="slidenum">
+              <a:rPr lang="es-ES" smtClean="0"/>
+              <a:t>‹Nº›</a:t>
             </a:fld>
-            <a:endParaRPr lang="es-CL"/>
+            <a:endParaRPr lang="es-ES"/>
           </a:p>
         </p:txBody>
       </p:sp>
@@ -1375,7 +1375,7 @@
 
 <file path=ppt/slideLayouts/slideLayout5.xml><?xml version="1.0" encoding="utf-8"?>
 <p:sldLayout xmlns:a="http://schemas.openxmlformats.org/drawingml/2006/main" xmlns:r="http://schemas.openxmlformats.org/officeDocument/2006/relationships" xmlns:p="http://schemas.openxmlformats.org/presentationml/2006/main" type="twoTxTwoObj" preserve="1">
-  <p:cSld name="Comparison">
+  <p:cSld name="Comparación">
     <p:spTree>
       <p:nvGrpSpPr>
         <p:cNvPr id="1" name=""/>
@@ -1392,7 +1392,7 @@
       </p:grpSpPr>
       <p:sp>
         <p:nvSpPr>
-          <p:cNvPr id="2" name="Title 1"/>
+          <p:cNvPr id="2" name="1 Título"/>
           <p:cNvSpPr>
             <a:spLocks noGrp="1"/>
           </p:cNvSpPr>
@@ -1410,16 +1410,16 @@
           </a:lstStyle>
           <a:p>
             <a:r>
-              <a:rPr lang="en-US" smtClean="0"/>
-              <a:t>Click to edit Master title style</a:t>
-            </a:r>
-            <a:endParaRPr lang="es-CL"/>
-          </a:p>
-        </p:txBody>
-      </p:sp>
-      <p:sp>
-        <p:nvSpPr>
-          <p:cNvPr id="3" name="Text Placeholder 2"/>
+              <a:rPr lang="es-ES" smtClean="0"/>
+              <a:t>Haga clic para modificar el estilo de título del patrón</a:t>
+            </a:r>
+            <a:endParaRPr lang="es-ES"/>
+          </a:p>
+        </p:txBody>
+      </p:sp>
+      <p:sp>
+        <p:nvSpPr>
+          <p:cNvPr id="3" name="2 Marcador de texto"/>
           <p:cNvSpPr>
             <a:spLocks noGrp="1"/>
           </p:cNvSpPr>
@@ -1476,15 +1476,15 @@
           <a:p>
             <a:pPr lvl="0"/>
             <a:r>
-              <a:rPr lang="en-US" smtClean="0"/>
-              <a:t>Click to edit Master text styles</a:t>
-            </a:r>
-          </a:p>
-        </p:txBody>
-      </p:sp>
-      <p:sp>
-        <p:nvSpPr>
-          <p:cNvPr id="4" name="Content Placeholder 3"/>
+              <a:rPr lang="es-ES" smtClean="0"/>
+              <a:t>Haga clic para modificar el estilo de texto del patrón</a:t>
+            </a:r>
+          </a:p>
+        </p:txBody>
+      </p:sp>
+      <p:sp>
+        <p:nvSpPr>
+          <p:cNvPr id="4" name="3 Marcador de contenido"/>
           <p:cNvSpPr>
             <a:spLocks noGrp="1"/>
           </p:cNvSpPr>
@@ -1532,44 +1532,44 @@
           <a:p>
             <a:pPr lvl="0"/>
             <a:r>
-              <a:rPr lang="en-US" smtClean="0"/>
-              <a:t>Click to edit Master text styles</a:t>
+              <a:rPr lang="es-ES" smtClean="0"/>
+              <a:t>Haga clic para modificar el estilo de texto del patrón</a:t>
             </a:r>
           </a:p>
           <a:p>
             <a:pPr lvl="1"/>
             <a:r>
-              <a:rPr lang="en-US" smtClean="0"/>
-              <a:t>Second level</a:t>
+              <a:rPr lang="es-ES" smtClean="0"/>
+              <a:t>Segundo nivel</a:t>
             </a:r>
           </a:p>
           <a:p>
             <a:pPr lvl="2"/>
             <a:r>
-              <a:rPr lang="en-US" smtClean="0"/>
-              <a:t>Third level</a:t>
+              <a:rPr lang="es-ES" smtClean="0"/>
+              <a:t>Tercer nivel</a:t>
             </a:r>
           </a:p>
           <a:p>
             <a:pPr lvl="3"/>
             <a:r>
-              <a:rPr lang="en-US" smtClean="0"/>
-              <a:t>Fourth level</a:t>
+              <a:rPr lang="es-ES" smtClean="0"/>
+              <a:t>Cuarto nivel</a:t>
             </a:r>
           </a:p>
           <a:p>
             <a:pPr lvl="4"/>
             <a:r>
-              <a:rPr lang="en-US" smtClean="0"/>
-              <a:t>Fifth level</a:t>
-            </a:r>
-            <a:endParaRPr lang="es-CL"/>
-          </a:p>
-        </p:txBody>
-      </p:sp>
-      <p:sp>
-        <p:nvSpPr>
-          <p:cNvPr id="5" name="Text Placeholder 4"/>
+              <a:rPr lang="es-ES" smtClean="0"/>
+              <a:t>Quinto nivel</a:t>
+            </a:r>
+            <a:endParaRPr lang="es-ES"/>
+          </a:p>
+        </p:txBody>
+      </p:sp>
+      <p:sp>
+        <p:nvSpPr>
+          <p:cNvPr id="5" name="4 Marcador de texto"/>
           <p:cNvSpPr>
             <a:spLocks noGrp="1"/>
           </p:cNvSpPr>
@@ -1626,15 +1626,15 @@
           <a:p>
             <a:pPr lvl="0"/>
             <a:r>
-              <a:rPr lang="en-US" smtClean="0"/>
-              <a:t>Click to edit Master text styles</a:t>
-            </a:r>
-          </a:p>
-        </p:txBody>
-      </p:sp>
-      <p:sp>
-        <p:nvSpPr>
-          <p:cNvPr id="6" name="Content Placeholder 5"/>
+              <a:rPr lang="es-ES" smtClean="0"/>
+              <a:t>Haga clic para modificar el estilo de texto del patrón</a:t>
+            </a:r>
+          </a:p>
+        </p:txBody>
+      </p:sp>
+      <p:sp>
+        <p:nvSpPr>
+          <p:cNvPr id="6" name="5 Marcador de contenido"/>
           <p:cNvSpPr>
             <a:spLocks noGrp="1"/>
           </p:cNvSpPr>
@@ -1682,44 +1682,44 @@
           <a:p>
             <a:pPr lvl="0"/>
             <a:r>
-              <a:rPr lang="en-US" smtClean="0"/>
-              <a:t>Click to edit Master text styles</a:t>
+              <a:rPr lang="es-ES" smtClean="0"/>
+              <a:t>Haga clic para modificar el estilo de texto del patrón</a:t>
             </a:r>
           </a:p>
           <a:p>
             <a:pPr lvl="1"/>
             <a:r>
-              <a:rPr lang="en-US" smtClean="0"/>
-              <a:t>Second level</a:t>
+              <a:rPr lang="es-ES" smtClean="0"/>
+              <a:t>Segundo nivel</a:t>
             </a:r>
           </a:p>
           <a:p>
             <a:pPr lvl="2"/>
             <a:r>
-              <a:rPr lang="en-US" smtClean="0"/>
-              <a:t>Third level</a:t>
+              <a:rPr lang="es-ES" smtClean="0"/>
+              <a:t>Tercer nivel</a:t>
             </a:r>
           </a:p>
           <a:p>
             <a:pPr lvl="3"/>
             <a:r>
-              <a:rPr lang="en-US" smtClean="0"/>
-              <a:t>Fourth level</a:t>
+              <a:rPr lang="es-ES" smtClean="0"/>
+              <a:t>Cuarto nivel</a:t>
             </a:r>
           </a:p>
           <a:p>
             <a:pPr lvl="4"/>
             <a:r>
-              <a:rPr lang="en-US" smtClean="0"/>
-              <a:t>Fifth level</a:t>
-            </a:r>
-            <a:endParaRPr lang="es-CL"/>
-          </a:p>
-        </p:txBody>
-      </p:sp>
-      <p:sp>
-        <p:nvSpPr>
-          <p:cNvPr id="7" name="Date Placeholder 6"/>
+              <a:rPr lang="es-ES" smtClean="0"/>
+              <a:t>Quinto nivel</a:t>
+            </a:r>
+            <a:endParaRPr lang="es-ES"/>
+          </a:p>
+        </p:txBody>
+      </p:sp>
+      <p:sp>
+        <p:nvSpPr>
+          <p:cNvPr id="7" name="6 Marcador de fecha"/>
           <p:cNvSpPr>
             <a:spLocks noGrp="1"/>
           </p:cNvSpPr>
@@ -1732,17 +1732,17 @@
           <a:bodyPr/>
           <a:lstStyle/>
           <a:p>
-            <a:fld id="{8970EC39-E361-4602-A3A9-40C409064D40}" type="datetimeFigureOut">
-              <a:rPr lang="es-CL" smtClean="0"/>
-              <a:t>14-03-2013</a:t>
+            <a:fld id="{486AC70B-00E8-4BFA-AADE-B3DB6703A030}" type="datetimeFigureOut">
+              <a:rPr lang="es-ES" smtClean="0"/>
+              <a:t>18/03/2013</a:t>
             </a:fld>
-            <a:endParaRPr lang="es-CL"/>
-          </a:p>
-        </p:txBody>
-      </p:sp>
-      <p:sp>
-        <p:nvSpPr>
-          <p:cNvPr id="8" name="Footer Placeholder 7"/>
+            <a:endParaRPr lang="es-ES"/>
+          </a:p>
+        </p:txBody>
+      </p:sp>
+      <p:sp>
+        <p:nvSpPr>
+          <p:cNvPr id="8" name="7 Marcador de pie de página"/>
           <p:cNvSpPr>
             <a:spLocks noGrp="1"/>
           </p:cNvSpPr>
@@ -1755,13 +1755,13 @@
           <a:bodyPr/>
           <a:lstStyle/>
           <a:p>
-            <a:endParaRPr lang="es-CL"/>
-          </a:p>
-        </p:txBody>
-      </p:sp>
-      <p:sp>
-        <p:nvSpPr>
-          <p:cNvPr id="9" name="Slide Number Placeholder 8"/>
+            <a:endParaRPr lang="es-ES"/>
+          </a:p>
+        </p:txBody>
+      </p:sp>
+      <p:sp>
+        <p:nvSpPr>
+          <p:cNvPr id="9" name="8 Marcador de número de diapositiva"/>
           <p:cNvSpPr>
             <a:spLocks noGrp="1"/>
           </p:cNvSpPr>
@@ -1774,11 +1774,11 @@
           <a:bodyPr/>
           <a:lstStyle/>
           <a:p>
-            <a:fld id="{01591DC6-E42F-4BA5-A114-12E63EDD4FE9}" type="slidenum">
-              <a:rPr lang="es-CL" smtClean="0"/>
-              <a:t>‹#›</a:t>
+            <a:fld id="{DED4FB0F-F7DE-47F7-8715-EE2F371FAFB0}" type="slidenum">
+              <a:rPr lang="es-ES" smtClean="0"/>
+              <a:t>‹Nº›</a:t>
             </a:fld>
-            <a:endParaRPr lang="es-CL"/>
+            <a:endParaRPr lang="es-ES"/>
           </a:p>
         </p:txBody>
       </p:sp>
@@ -1792,7 +1792,7 @@
 
 <file path=ppt/slideLayouts/slideLayout6.xml><?xml version="1.0" encoding="utf-8"?>
 <p:sldLayout xmlns:a="http://schemas.openxmlformats.org/drawingml/2006/main" xmlns:r="http://schemas.openxmlformats.org/officeDocument/2006/relationships" xmlns:p="http://schemas.openxmlformats.org/presentationml/2006/main" type="titleOnly" preserve="1">
-  <p:cSld name="Title Only">
+  <p:cSld name="Sólo el título">
     <p:spTree>
       <p:nvGrpSpPr>
         <p:cNvPr id="1" name=""/>
@@ -1809,7 +1809,7 @@
       </p:grpSpPr>
       <p:sp>
         <p:nvSpPr>
-          <p:cNvPr id="2" name="Title 1"/>
+          <p:cNvPr id="2" name="1 Título"/>
           <p:cNvSpPr>
             <a:spLocks noGrp="1"/>
           </p:cNvSpPr>
@@ -1823,16 +1823,16 @@
           <a:lstStyle/>
           <a:p>
             <a:r>
-              <a:rPr lang="en-US" smtClean="0"/>
-              <a:t>Click to edit Master title style</a:t>
-            </a:r>
-            <a:endParaRPr lang="es-CL"/>
-          </a:p>
-        </p:txBody>
-      </p:sp>
-      <p:sp>
-        <p:nvSpPr>
-          <p:cNvPr id="3" name="Date Placeholder 2"/>
+              <a:rPr lang="es-ES" smtClean="0"/>
+              <a:t>Haga clic para modificar el estilo de título del patrón</a:t>
+            </a:r>
+            <a:endParaRPr lang="es-ES"/>
+          </a:p>
+        </p:txBody>
+      </p:sp>
+      <p:sp>
+        <p:nvSpPr>
+          <p:cNvPr id="3" name="2 Marcador de fecha"/>
           <p:cNvSpPr>
             <a:spLocks noGrp="1"/>
           </p:cNvSpPr>
@@ -1845,17 +1845,17 @@
           <a:bodyPr/>
           <a:lstStyle/>
           <a:p>
-            <a:fld id="{8970EC39-E361-4602-A3A9-40C409064D40}" type="datetimeFigureOut">
-              <a:rPr lang="es-CL" smtClean="0"/>
-              <a:t>14-03-2013</a:t>
+            <a:fld id="{486AC70B-00E8-4BFA-AADE-B3DB6703A030}" type="datetimeFigureOut">
+              <a:rPr lang="es-ES" smtClean="0"/>
+              <a:t>18/03/2013</a:t>
             </a:fld>
-            <a:endParaRPr lang="es-CL"/>
-          </a:p>
-        </p:txBody>
-      </p:sp>
-      <p:sp>
-        <p:nvSpPr>
-          <p:cNvPr id="4" name="Footer Placeholder 3"/>
+            <a:endParaRPr lang="es-ES"/>
+          </a:p>
+        </p:txBody>
+      </p:sp>
+      <p:sp>
+        <p:nvSpPr>
+          <p:cNvPr id="4" name="3 Marcador de pie de página"/>
           <p:cNvSpPr>
             <a:spLocks noGrp="1"/>
           </p:cNvSpPr>
@@ -1868,13 +1868,13 @@
           <a:bodyPr/>
           <a:lstStyle/>
           <a:p>
-            <a:endParaRPr lang="es-CL"/>
-          </a:p>
-        </p:txBody>
-      </p:sp>
-      <p:sp>
-        <p:nvSpPr>
-          <p:cNvPr id="5" name="Slide Number Placeholder 4"/>
+            <a:endParaRPr lang="es-ES"/>
+          </a:p>
+        </p:txBody>
+      </p:sp>
+      <p:sp>
+        <p:nvSpPr>
+          <p:cNvPr id="5" name="4 Marcador de número de diapositiva"/>
           <p:cNvSpPr>
             <a:spLocks noGrp="1"/>
           </p:cNvSpPr>
@@ -1887,11 +1887,11 @@
           <a:bodyPr/>
           <a:lstStyle/>
           <a:p>
-            <a:fld id="{01591DC6-E42F-4BA5-A114-12E63EDD4FE9}" type="slidenum">
-              <a:rPr lang="es-CL" smtClean="0"/>
-              <a:t>‹#›</a:t>
+            <a:fld id="{DED4FB0F-F7DE-47F7-8715-EE2F371FAFB0}" type="slidenum">
+              <a:rPr lang="es-ES" smtClean="0"/>
+              <a:t>‹Nº›</a:t>
             </a:fld>
-            <a:endParaRPr lang="es-CL"/>
+            <a:endParaRPr lang="es-ES"/>
           </a:p>
         </p:txBody>
       </p:sp>
@@ -1905,7 +1905,7 @@
 
 <file path=ppt/slideLayouts/slideLayout7.xml><?xml version="1.0" encoding="utf-8"?>
 <p:sldLayout xmlns:a="http://schemas.openxmlformats.org/drawingml/2006/main" xmlns:r="http://schemas.openxmlformats.org/officeDocument/2006/relationships" xmlns:p="http://schemas.openxmlformats.org/presentationml/2006/main" type="blank" preserve="1">
-  <p:cSld name="Blank">
+  <p:cSld name="En blanco">
     <p:spTree>
       <p:nvGrpSpPr>
         <p:cNvPr id="1" name=""/>
@@ -1922,7 +1922,7 @@
       </p:grpSpPr>
       <p:sp>
         <p:nvSpPr>
-          <p:cNvPr id="2" name="Date Placeholder 1"/>
+          <p:cNvPr id="2" name="1 Marcador de fecha"/>
           <p:cNvSpPr>
             <a:spLocks noGrp="1"/>
           </p:cNvSpPr>
@@ -1935,17 +1935,17 @@
           <a:bodyPr/>
           <a:lstStyle/>
           <a:p>
-            <a:fld id="{8970EC39-E361-4602-A3A9-40C409064D40}" type="datetimeFigureOut">
-              <a:rPr lang="es-CL" smtClean="0"/>
-              <a:t>14-03-2013</a:t>
+            <a:fld id="{486AC70B-00E8-4BFA-AADE-B3DB6703A030}" type="datetimeFigureOut">
+              <a:rPr lang="es-ES" smtClean="0"/>
+              <a:t>18/03/2013</a:t>
             </a:fld>
-            <a:endParaRPr lang="es-CL"/>
-          </a:p>
-        </p:txBody>
-      </p:sp>
-      <p:sp>
-        <p:nvSpPr>
-          <p:cNvPr id="3" name="Footer Placeholder 2"/>
+            <a:endParaRPr lang="es-ES"/>
+          </a:p>
+        </p:txBody>
+      </p:sp>
+      <p:sp>
+        <p:nvSpPr>
+          <p:cNvPr id="3" name="2 Marcador de pie de página"/>
           <p:cNvSpPr>
             <a:spLocks noGrp="1"/>
           </p:cNvSpPr>
@@ -1958,13 +1958,13 @@
           <a:bodyPr/>
           <a:lstStyle/>
           <a:p>
-            <a:endParaRPr lang="es-CL"/>
-          </a:p>
-        </p:txBody>
-      </p:sp>
-      <p:sp>
-        <p:nvSpPr>
-          <p:cNvPr id="4" name="Slide Number Placeholder 3"/>
+            <a:endParaRPr lang="es-ES"/>
+          </a:p>
+        </p:txBody>
+      </p:sp>
+      <p:sp>
+        <p:nvSpPr>
+          <p:cNvPr id="4" name="3 Marcador de número de diapositiva"/>
           <p:cNvSpPr>
             <a:spLocks noGrp="1"/>
           </p:cNvSpPr>
@@ -1977,11 +1977,11 @@
           <a:bodyPr/>
           <a:lstStyle/>
           <a:p>
-            <a:fld id="{01591DC6-E42F-4BA5-A114-12E63EDD4FE9}" type="slidenum">
-              <a:rPr lang="es-CL" smtClean="0"/>
-              <a:t>‹#›</a:t>
+            <a:fld id="{DED4FB0F-F7DE-47F7-8715-EE2F371FAFB0}" type="slidenum">
+              <a:rPr lang="es-ES" smtClean="0"/>
+              <a:t>‹Nº›</a:t>
             </a:fld>
-            <a:endParaRPr lang="es-CL"/>
+            <a:endParaRPr lang="es-ES"/>
           </a:p>
         </p:txBody>
       </p:sp>
@@ -1995,7 +1995,7 @@
 
 <file path=ppt/slideLayouts/slideLayout8.xml><?xml version="1.0" encoding="utf-8"?>
 <p:sldLayout xmlns:a="http://schemas.openxmlformats.org/drawingml/2006/main" xmlns:r="http://schemas.openxmlformats.org/officeDocument/2006/relationships" xmlns:p="http://schemas.openxmlformats.org/presentationml/2006/main" type="objTx" preserve="1">
-  <p:cSld name="Content with Caption">
+  <p:cSld name="Contenido con título">
     <p:spTree>
       <p:nvGrpSpPr>
         <p:cNvPr id="1" name=""/>
@@ -2012,7 +2012,7 @@
       </p:grpSpPr>
       <p:sp>
         <p:nvSpPr>
-          <p:cNvPr id="2" name="Title 1"/>
+          <p:cNvPr id="2" name="1 Título"/>
           <p:cNvSpPr>
             <a:spLocks noGrp="1"/>
           </p:cNvSpPr>
@@ -2035,16 +2035,16 @@
           </a:lstStyle>
           <a:p>
             <a:r>
-              <a:rPr lang="en-US" smtClean="0"/>
-              <a:t>Click to edit Master title style</a:t>
-            </a:r>
-            <a:endParaRPr lang="es-CL"/>
-          </a:p>
-        </p:txBody>
-      </p:sp>
-      <p:sp>
-        <p:nvSpPr>
-          <p:cNvPr id="3" name="Content Placeholder 2"/>
+              <a:rPr lang="es-ES" smtClean="0"/>
+              <a:t>Haga clic para modificar el estilo de título del patrón</a:t>
+            </a:r>
+            <a:endParaRPr lang="es-ES"/>
+          </a:p>
+        </p:txBody>
+      </p:sp>
+      <p:sp>
+        <p:nvSpPr>
+          <p:cNvPr id="3" name="2 Marcador de contenido"/>
           <p:cNvSpPr>
             <a:spLocks noGrp="1"/>
           </p:cNvSpPr>
@@ -2092,44 +2092,44 @@
           <a:p>
             <a:pPr lvl="0"/>
             <a:r>
-              <a:rPr lang="en-US" smtClean="0"/>
-              <a:t>Click to edit Master text styles</a:t>
+              <a:rPr lang="es-ES" smtClean="0"/>
+              <a:t>Haga clic para modificar el estilo de texto del patrón</a:t>
             </a:r>
           </a:p>
           <a:p>
             <a:pPr lvl="1"/>
             <a:r>
-              <a:rPr lang="en-US" smtClean="0"/>
-              <a:t>Second level</a:t>
+              <a:rPr lang="es-ES" smtClean="0"/>
+              <a:t>Segundo nivel</a:t>
             </a:r>
           </a:p>
           <a:p>
             <a:pPr lvl="2"/>
             <a:r>
-              <a:rPr lang="en-US" smtClean="0"/>
-              <a:t>Third level</a:t>
+              <a:rPr lang="es-ES" smtClean="0"/>
+              <a:t>Tercer nivel</a:t>
             </a:r>
           </a:p>
           <a:p>
             <a:pPr lvl="3"/>
             <a:r>
-              <a:rPr lang="en-US" smtClean="0"/>
-              <a:t>Fourth level</a:t>
+              <a:rPr lang="es-ES" smtClean="0"/>
+              <a:t>Cuarto nivel</a:t>
             </a:r>
           </a:p>
           <a:p>
             <a:pPr lvl="4"/>
             <a:r>
-              <a:rPr lang="en-US" smtClean="0"/>
-              <a:t>Fifth level</a:t>
-            </a:r>
-            <a:endParaRPr lang="es-CL"/>
-          </a:p>
-        </p:txBody>
-      </p:sp>
-      <p:sp>
-        <p:nvSpPr>
-          <p:cNvPr id="4" name="Text Placeholder 3"/>
+              <a:rPr lang="es-ES" smtClean="0"/>
+              <a:t>Quinto nivel</a:t>
+            </a:r>
+            <a:endParaRPr lang="es-ES"/>
+          </a:p>
+        </p:txBody>
+      </p:sp>
+      <p:sp>
+        <p:nvSpPr>
+          <p:cNvPr id="4" name="3 Marcador de texto"/>
           <p:cNvSpPr>
             <a:spLocks noGrp="1"/>
           </p:cNvSpPr>
@@ -2186,15 +2186,15 @@
           <a:p>
             <a:pPr lvl="0"/>
             <a:r>
-              <a:rPr lang="en-US" smtClean="0"/>
-              <a:t>Click to edit Master text styles</a:t>
-            </a:r>
-          </a:p>
-        </p:txBody>
-      </p:sp>
-      <p:sp>
-        <p:nvSpPr>
-          <p:cNvPr id="5" name="Date Placeholder 4"/>
+              <a:rPr lang="es-ES" smtClean="0"/>
+              <a:t>Haga clic para modificar el estilo de texto del patrón</a:t>
+            </a:r>
+          </a:p>
+        </p:txBody>
+      </p:sp>
+      <p:sp>
+        <p:nvSpPr>
+          <p:cNvPr id="5" name="4 Marcador de fecha"/>
           <p:cNvSpPr>
             <a:spLocks noGrp="1"/>
           </p:cNvSpPr>
@@ -2207,17 +2207,17 @@
           <a:bodyPr/>
           <a:lstStyle/>
           <a:p>
-            <a:fld id="{8970EC39-E361-4602-A3A9-40C409064D40}" type="datetimeFigureOut">
-              <a:rPr lang="es-CL" smtClean="0"/>
-              <a:t>14-03-2013</a:t>
+            <a:fld id="{486AC70B-00E8-4BFA-AADE-B3DB6703A030}" type="datetimeFigureOut">
+              <a:rPr lang="es-ES" smtClean="0"/>
+              <a:t>18/03/2013</a:t>
             </a:fld>
-            <a:endParaRPr lang="es-CL"/>
-          </a:p>
-        </p:txBody>
-      </p:sp>
-      <p:sp>
-        <p:nvSpPr>
-          <p:cNvPr id="6" name="Footer Placeholder 5"/>
+            <a:endParaRPr lang="es-ES"/>
+          </a:p>
+        </p:txBody>
+      </p:sp>
+      <p:sp>
+        <p:nvSpPr>
+          <p:cNvPr id="6" name="5 Marcador de pie de página"/>
           <p:cNvSpPr>
             <a:spLocks noGrp="1"/>
           </p:cNvSpPr>
@@ -2230,13 +2230,13 @@
           <a:bodyPr/>
           <a:lstStyle/>
           <a:p>
-            <a:endParaRPr lang="es-CL"/>
-          </a:p>
-        </p:txBody>
-      </p:sp>
-      <p:sp>
-        <p:nvSpPr>
-          <p:cNvPr id="7" name="Slide Number Placeholder 6"/>
+            <a:endParaRPr lang="es-ES"/>
+          </a:p>
+        </p:txBody>
+      </p:sp>
+      <p:sp>
+        <p:nvSpPr>
+          <p:cNvPr id="7" name="6 Marcador de número de diapositiva"/>
           <p:cNvSpPr>
             <a:spLocks noGrp="1"/>
           </p:cNvSpPr>
@@ -2249,11 +2249,11 @@
           <a:bodyPr/>
           <a:lstStyle/>
           <a:p>
-            <a:fld id="{01591DC6-E42F-4BA5-A114-12E63EDD4FE9}" type="slidenum">
-              <a:rPr lang="es-CL" smtClean="0"/>
-              <a:t>‹#›</a:t>
+            <a:fld id="{DED4FB0F-F7DE-47F7-8715-EE2F371FAFB0}" type="slidenum">
+              <a:rPr lang="es-ES" smtClean="0"/>
+              <a:t>‹Nº›</a:t>
             </a:fld>
-            <a:endParaRPr lang="es-CL"/>
+            <a:endParaRPr lang="es-ES"/>
           </a:p>
         </p:txBody>
       </p:sp>
@@ -2267,7 +2267,7 @@
 
 <file path=ppt/slideLayouts/slideLayout9.xml><?xml version="1.0" encoding="utf-8"?>
 <p:sldLayout xmlns:a="http://schemas.openxmlformats.org/drawingml/2006/main" xmlns:r="http://schemas.openxmlformats.org/officeDocument/2006/relationships" xmlns:p="http://schemas.openxmlformats.org/presentationml/2006/main" type="picTx" preserve="1">
-  <p:cSld name="Picture with Caption">
+  <p:cSld name="Imagen con título">
     <p:spTree>
       <p:nvGrpSpPr>
         <p:cNvPr id="1" name=""/>
@@ -2284,7 +2284,7 @@
       </p:grpSpPr>
       <p:sp>
         <p:nvSpPr>
-          <p:cNvPr id="2" name="Title 1"/>
+          <p:cNvPr id="2" name="1 Título"/>
           <p:cNvSpPr>
             <a:spLocks noGrp="1"/>
           </p:cNvSpPr>
@@ -2307,16 +2307,16 @@
           </a:lstStyle>
           <a:p>
             <a:r>
-              <a:rPr lang="en-US" smtClean="0"/>
-              <a:t>Click to edit Master title style</a:t>
-            </a:r>
-            <a:endParaRPr lang="es-CL"/>
-          </a:p>
-        </p:txBody>
-      </p:sp>
-      <p:sp>
-        <p:nvSpPr>
-          <p:cNvPr id="3" name="Picture Placeholder 2"/>
+              <a:rPr lang="es-ES" smtClean="0"/>
+              <a:t>Haga clic para modificar el estilo de título del patrón</a:t>
+            </a:r>
+            <a:endParaRPr lang="es-ES"/>
+          </a:p>
+        </p:txBody>
+      </p:sp>
+      <p:sp>
+        <p:nvSpPr>
+          <p:cNvPr id="3" name="2 Marcador de posición de imagen"/>
           <p:cNvSpPr>
             <a:spLocks noGrp="1"/>
           </p:cNvSpPr>
@@ -2371,13 +2371,13 @@
             </a:lvl9pPr>
           </a:lstStyle>
           <a:p>
-            <a:endParaRPr lang="es-CL"/>
-          </a:p>
-        </p:txBody>
-      </p:sp>
-      <p:sp>
-        <p:nvSpPr>
-          <p:cNvPr id="4" name="Text Placeholder 3"/>
+            <a:endParaRPr lang="es-ES"/>
+          </a:p>
+        </p:txBody>
+      </p:sp>
+      <p:sp>
+        <p:nvSpPr>
+          <p:cNvPr id="4" name="3 Marcador de texto"/>
           <p:cNvSpPr>
             <a:spLocks noGrp="1"/>
           </p:cNvSpPr>
@@ -2434,15 +2434,15 @@
           <a:p>
             <a:pPr lvl="0"/>
             <a:r>
-              <a:rPr lang="en-US" smtClean="0"/>
-              <a:t>Click to edit Master text styles</a:t>
-            </a:r>
-          </a:p>
-        </p:txBody>
-      </p:sp>
-      <p:sp>
-        <p:nvSpPr>
-          <p:cNvPr id="5" name="Date Placeholder 4"/>
+              <a:rPr lang="es-ES" smtClean="0"/>
+              <a:t>Haga clic para modificar el estilo de texto del patrón</a:t>
+            </a:r>
+          </a:p>
+        </p:txBody>
+      </p:sp>
+      <p:sp>
+        <p:nvSpPr>
+          <p:cNvPr id="5" name="4 Marcador de fecha"/>
           <p:cNvSpPr>
             <a:spLocks noGrp="1"/>
           </p:cNvSpPr>
@@ -2455,17 +2455,17 @@
           <a:bodyPr/>
           <a:lstStyle/>
           <a:p>
-            <a:fld id="{8970EC39-E361-4602-A3A9-40C409064D40}" type="datetimeFigureOut">
-              <a:rPr lang="es-CL" smtClean="0"/>
-              <a:t>14-03-2013</a:t>
+            <a:fld id="{486AC70B-00E8-4BFA-AADE-B3DB6703A030}" type="datetimeFigureOut">
+              <a:rPr lang="es-ES" smtClean="0"/>
+              <a:t>18/03/2013</a:t>
             </a:fld>
-            <a:endParaRPr lang="es-CL"/>
-          </a:p>
-        </p:txBody>
-      </p:sp>
-      <p:sp>
-        <p:nvSpPr>
-          <p:cNvPr id="6" name="Footer Placeholder 5"/>
+            <a:endParaRPr lang="es-ES"/>
+          </a:p>
+        </p:txBody>
+      </p:sp>
+      <p:sp>
+        <p:nvSpPr>
+          <p:cNvPr id="6" name="5 Marcador de pie de página"/>
           <p:cNvSpPr>
             <a:spLocks noGrp="1"/>
           </p:cNvSpPr>
@@ -2478,13 +2478,13 @@
           <a:bodyPr/>
           <a:lstStyle/>
           <a:p>
-            <a:endParaRPr lang="es-CL"/>
-          </a:p>
-        </p:txBody>
-      </p:sp>
-      <p:sp>
-        <p:nvSpPr>
-          <p:cNvPr id="7" name="Slide Number Placeholder 6"/>
+            <a:endParaRPr lang="es-ES"/>
+          </a:p>
+        </p:txBody>
+      </p:sp>
+      <p:sp>
+        <p:nvSpPr>
+          <p:cNvPr id="7" name="6 Marcador de número de diapositiva"/>
           <p:cNvSpPr>
             <a:spLocks noGrp="1"/>
           </p:cNvSpPr>
@@ -2497,11 +2497,11 @@
           <a:bodyPr/>
           <a:lstStyle/>
           <a:p>
-            <a:fld id="{01591DC6-E42F-4BA5-A114-12E63EDD4FE9}" type="slidenum">
-              <a:rPr lang="es-CL" smtClean="0"/>
-              <a:t>‹#›</a:t>
+            <a:fld id="{DED4FB0F-F7DE-47F7-8715-EE2F371FAFB0}" type="slidenum">
+              <a:rPr lang="es-ES" smtClean="0"/>
+              <a:t>‹Nº›</a:t>
             </a:fld>
-            <a:endParaRPr lang="es-CL"/>
+            <a:endParaRPr lang="es-ES"/>
           </a:p>
         </p:txBody>
       </p:sp>
@@ -2537,7 +2537,7 @@
       </p:grpSpPr>
       <p:sp>
         <p:nvSpPr>
-          <p:cNvPr id="2" name="Title Placeholder 1"/>
+          <p:cNvPr id="2" name="1 Marcador de título"/>
           <p:cNvSpPr>
             <a:spLocks noGrp="1"/>
           </p:cNvSpPr>
@@ -2561,16 +2561,16 @@
           <a:lstStyle/>
           <a:p>
             <a:r>
-              <a:rPr lang="en-US" smtClean="0"/>
-              <a:t>Click to edit Master title style</a:t>
-            </a:r>
-            <a:endParaRPr lang="es-CL"/>
-          </a:p>
-        </p:txBody>
-      </p:sp>
-      <p:sp>
-        <p:nvSpPr>
-          <p:cNvPr id="3" name="Text Placeholder 2"/>
+              <a:rPr lang="es-ES" smtClean="0"/>
+              <a:t>Haga clic para modificar el estilo de título del patrón</a:t>
+            </a:r>
+            <a:endParaRPr lang="es-ES"/>
+          </a:p>
+        </p:txBody>
+      </p:sp>
+      <p:sp>
+        <p:nvSpPr>
+          <p:cNvPr id="3" name="2 Marcador de texto"/>
           <p:cNvSpPr>
             <a:spLocks noGrp="1"/>
           </p:cNvSpPr>
@@ -2595,44 +2595,44 @@
           <a:p>
             <a:pPr lvl="0"/>
             <a:r>
-              <a:rPr lang="en-US" smtClean="0"/>
-              <a:t>Click to edit Master text styles</a:t>
+              <a:rPr lang="es-ES" smtClean="0"/>
+              <a:t>Haga clic para modificar el estilo de texto del patrón</a:t>
             </a:r>
           </a:p>
           <a:p>
             <a:pPr lvl="1"/>
             <a:r>
-              <a:rPr lang="en-US" smtClean="0"/>
-              <a:t>Second level</a:t>
+              <a:rPr lang="es-ES" smtClean="0"/>
+              <a:t>Segundo nivel</a:t>
             </a:r>
           </a:p>
           <a:p>
             <a:pPr lvl="2"/>
             <a:r>
-              <a:rPr lang="en-US" smtClean="0"/>
-              <a:t>Third level</a:t>
+              <a:rPr lang="es-ES" smtClean="0"/>
+              <a:t>Tercer nivel</a:t>
             </a:r>
           </a:p>
           <a:p>
             <a:pPr lvl="3"/>
             <a:r>
-              <a:rPr lang="en-US" smtClean="0"/>
-              <a:t>Fourth level</a:t>
+              <a:rPr lang="es-ES" smtClean="0"/>
+              <a:t>Cuarto nivel</a:t>
             </a:r>
           </a:p>
           <a:p>
             <a:pPr lvl="4"/>
             <a:r>
-              <a:rPr lang="en-US" smtClean="0"/>
-              <a:t>Fifth level</a:t>
-            </a:r>
-            <a:endParaRPr lang="es-CL"/>
-          </a:p>
-        </p:txBody>
-      </p:sp>
-      <p:sp>
-        <p:nvSpPr>
-          <p:cNvPr id="4" name="Date Placeholder 3"/>
+              <a:rPr lang="es-ES" smtClean="0"/>
+              <a:t>Quinto nivel</a:t>
+            </a:r>
+            <a:endParaRPr lang="es-ES"/>
+          </a:p>
+        </p:txBody>
+      </p:sp>
+      <p:sp>
+        <p:nvSpPr>
+          <p:cNvPr id="4" name="3 Marcador de fecha"/>
           <p:cNvSpPr>
             <a:spLocks noGrp="1"/>
           </p:cNvSpPr>
@@ -2663,17 +2663,17 @@
             </a:lvl1pPr>
           </a:lstStyle>
           <a:p>
-            <a:fld id="{8970EC39-E361-4602-A3A9-40C409064D40}" type="datetimeFigureOut">
-              <a:rPr lang="es-CL" smtClean="0"/>
-              <a:t>14-03-2013</a:t>
+            <a:fld id="{486AC70B-00E8-4BFA-AADE-B3DB6703A030}" type="datetimeFigureOut">
+              <a:rPr lang="es-ES" smtClean="0"/>
+              <a:t>18/03/2013</a:t>
             </a:fld>
-            <a:endParaRPr lang="es-CL"/>
-          </a:p>
-        </p:txBody>
-      </p:sp>
-      <p:sp>
-        <p:nvSpPr>
-          <p:cNvPr id="5" name="Footer Placeholder 4"/>
+            <a:endParaRPr lang="es-ES"/>
+          </a:p>
+        </p:txBody>
+      </p:sp>
+      <p:sp>
+        <p:nvSpPr>
+          <p:cNvPr id="5" name="4 Marcador de pie de página"/>
           <p:cNvSpPr>
             <a:spLocks noGrp="1"/>
           </p:cNvSpPr>
@@ -2704,13 +2704,13 @@
             </a:lvl1pPr>
           </a:lstStyle>
           <a:p>
-            <a:endParaRPr lang="es-CL"/>
-          </a:p>
-        </p:txBody>
-      </p:sp>
-      <p:sp>
-        <p:nvSpPr>
-          <p:cNvPr id="6" name="Slide Number Placeholder 5"/>
+            <a:endParaRPr lang="es-ES"/>
+          </a:p>
+        </p:txBody>
+      </p:sp>
+      <p:sp>
+        <p:nvSpPr>
+          <p:cNvPr id="6" name="5 Marcador de número de diapositiva"/>
           <p:cNvSpPr>
             <a:spLocks noGrp="1"/>
           </p:cNvSpPr>
@@ -2741,11 +2741,11 @@
             </a:lvl1pPr>
           </a:lstStyle>
           <a:p>
-            <a:fld id="{01591DC6-E42F-4BA5-A114-12E63EDD4FE9}" type="slidenum">
-              <a:rPr lang="es-CL" smtClean="0"/>
-              <a:t>‹#›</a:t>
+            <a:fld id="{DED4FB0F-F7DE-47F7-8715-EE2F371FAFB0}" type="slidenum">
+              <a:rPr lang="es-ES" smtClean="0"/>
+              <a:t>‹Nº›</a:t>
             </a:fld>
-            <a:endParaRPr lang="es-CL"/>
+            <a:endParaRPr lang="es-ES"/>
           </a:p>
         </p:txBody>
       </p:sp>
@@ -2921,7 +2921,7 @@
     </p:bodyStyle>
     <p:otherStyle>
       <a:defPPr>
-        <a:defRPr lang="es-CL"/>
+        <a:defRPr lang="es-ES"/>
       </a:defPPr>
       <a:lvl1pPr marL="0" algn="l" defTabSz="914400" rtl="0" eaLnBrk="1" latinLnBrk="0" hangingPunct="1">
         <a:defRPr sz="1800" kern="1200">
@@ -3035,300 +3035,92 @@
           <a:chExt cx="0" cy="0"/>
         </a:xfrm>
       </p:grpSpPr>
-      <p:sp>
-        <p:nvSpPr>
-          <p:cNvPr id="20" name="Trapezoid 19"/>
-          <p:cNvSpPr/>
+      <p:pic>
+        <p:nvPicPr>
+          <p:cNvPr id="3074" name="Picture 2"/>
+          <p:cNvPicPr>
+            <a:picLocks noChangeAspect="1" noChangeArrowheads="1"/>
+          </p:cNvPicPr>
           <p:nvPr/>
-        </p:nvSpPr>
-        <p:spPr>
-          <a:xfrm flipV="1">
-            <a:off x="3071802" y="5157800"/>
-            <a:ext cx="4643470" cy="214314"/>
-          </a:xfrm>
-          <a:prstGeom prst="trapezoid">
-            <a:avLst>
-              <a:gd name="adj" fmla="val 46448"/>
-            </a:avLst>
-          </a:prstGeom>
-          <a:solidFill>
-            <a:srgbClr val="311ABC"/>
-          </a:solidFill>
-          <a:ln>
-            <a:noFill/>
-          </a:ln>
-        </p:spPr>
-        <p:style>
-          <a:lnRef idx="2">
-            <a:schemeClr val="accent1">
-              <a:shade val="50000"/>
-            </a:schemeClr>
-          </a:lnRef>
-          <a:fillRef idx="1">
-            <a:schemeClr val="accent1"/>
-          </a:fillRef>
-          <a:effectRef idx="0">
-            <a:schemeClr val="accent1"/>
-          </a:effectRef>
-          <a:fontRef idx="minor">
-            <a:schemeClr val="lt1"/>
-          </a:fontRef>
-        </p:style>
-        <p:txBody>
-          <a:bodyPr rtlCol="0" anchor="ctr"/>
-          <a:lstStyle/>
-          <a:p>
-            <a:pPr algn="ctr"/>
-            <a:endParaRPr lang="es-CL"/>
-          </a:p>
-        </p:txBody>
-      </p:sp>
-      <p:sp>
-        <p:nvSpPr>
-          <p:cNvPr id="21" name="Trapezoid 20"/>
-          <p:cNvSpPr/>
-          <p:nvPr/>
-        </p:nvSpPr>
-        <p:spPr>
-          <a:xfrm flipV="1">
-            <a:off x="3178959" y="5414977"/>
-            <a:ext cx="4429156" cy="214314"/>
-          </a:xfrm>
-          <a:prstGeom prst="trapezoid">
-            <a:avLst>
-              <a:gd name="adj" fmla="val 46448"/>
-            </a:avLst>
-          </a:prstGeom>
-          <a:solidFill>
-            <a:srgbClr val="F92913"/>
-          </a:solidFill>
-          <a:ln>
-            <a:noFill/>
-          </a:ln>
-        </p:spPr>
-        <p:style>
-          <a:lnRef idx="2">
-            <a:schemeClr val="accent1">
-              <a:shade val="50000"/>
-            </a:schemeClr>
-          </a:lnRef>
-          <a:fillRef idx="1">
-            <a:schemeClr val="accent1"/>
-          </a:fillRef>
-          <a:effectRef idx="0">
-            <a:schemeClr val="accent1"/>
-          </a:effectRef>
-          <a:fontRef idx="minor">
-            <a:schemeClr val="lt1"/>
-          </a:fontRef>
-        </p:style>
-        <p:txBody>
-          <a:bodyPr rtlCol="0" anchor="ctr"/>
-          <a:lstStyle/>
-          <a:p>
-            <a:pPr algn="ctr"/>
-            <a:endParaRPr lang="es-CL"/>
-          </a:p>
-        </p:txBody>
-      </p:sp>
-      <p:sp>
-        <p:nvSpPr>
-          <p:cNvPr id="22" name="Trapezoid 21"/>
-          <p:cNvSpPr/>
-          <p:nvPr/>
-        </p:nvSpPr>
-        <p:spPr>
-          <a:xfrm flipV="1">
-            <a:off x="3321835" y="5672154"/>
-            <a:ext cx="4143404" cy="214314"/>
-          </a:xfrm>
-          <a:prstGeom prst="trapezoid">
-            <a:avLst>
-              <a:gd name="adj" fmla="val 46448"/>
-            </a:avLst>
-          </a:prstGeom>
-          <a:solidFill>
-            <a:srgbClr val="F92913"/>
-          </a:solidFill>
-          <a:ln>
-            <a:noFill/>
-          </a:ln>
-        </p:spPr>
-        <p:style>
-          <a:lnRef idx="2">
-            <a:schemeClr val="accent1">
-              <a:shade val="50000"/>
-            </a:schemeClr>
-          </a:lnRef>
-          <a:fillRef idx="1">
-            <a:schemeClr val="accent1"/>
-          </a:fillRef>
-          <a:effectRef idx="0">
-            <a:schemeClr val="accent1"/>
-          </a:effectRef>
-          <a:fontRef idx="minor">
-            <a:schemeClr val="lt1"/>
-          </a:fontRef>
-        </p:style>
-        <p:txBody>
-          <a:bodyPr rtlCol="0" anchor="ctr"/>
-          <a:lstStyle/>
-          <a:p>
-            <a:pPr algn="ctr"/>
-            <a:endParaRPr lang="es-CL"/>
-          </a:p>
-        </p:txBody>
-      </p:sp>
-      <p:sp>
-        <p:nvSpPr>
-          <p:cNvPr id="37" name="Title 1"/>
-          <p:cNvSpPr txBox="1">
-            <a:spLocks/>
-          </p:cNvSpPr>
-          <p:nvPr/>
-        </p:nvSpPr>
-        <p:spPr>
+        </p:nvPicPr>
+        <p:blipFill>
+          <a:blip r:embed="rId2">
+            <a:extLst>
+              <a:ext uri="{28A0092B-C50C-407E-A947-70E740481C1C}">
+                <a14:useLocalDpi xmlns="" xmlns:a14="http://schemas.microsoft.com/office/drawing/2010/main" val="0"/>
+              </a:ext>
+            </a:extLst>
+          </a:blip>
+          <a:srcRect/>
+          <a:stretch>
+            <a:fillRect/>
+          </a:stretch>
+        </p:blipFill>
+        <p:spPr bwMode="auto">
           <a:xfrm>
-            <a:off x="3593537" y="5386520"/>
-            <a:ext cx="3600000" cy="685686"/>
+            <a:off x="0" y="0"/>
+            <a:ext cx="9144000" cy="6858418"/>
           </a:xfrm>
           <a:prstGeom prst="rect">
             <a:avLst/>
           </a:prstGeom>
-          <a:solidFill>
-            <a:schemeClr val="bg1"/>
-          </a:solidFill>
+          <a:noFill/>
           <a:ln>
             <a:noFill/>
           </a:ln>
-        </p:spPr>
-        <p:txBody>
-          <a:bodyPr vert="horz" lIns="91440" tIns="45720" rIns="91440" bIns="45720" rtlCol="0" anchor="ctr">
-            <a:noAutofit/>
-          </a:bodyPr>
-          <a:lstStyle/>
-          <a:p>
-            <a:pPr marL="0" marR="0" lvl="0" indent="0" algn="ctr" defTabSz="914400" rtl="0" eaLnBrk="1" fontAlgn="auto" latinLnBrk="0" hangingPunct="1">
-              <a:lnSpc>
-                <a:spcPct val="100000"/>
-              </a:lnSpc>
-              <a:spcBef>
-                <a:spcPct val="0"/>
-              </a:spcBef>
-              <a:spcAft>
-                <a:spcPts val="0"/>
-              </a:spcAft>
-              <a:buClrTx/>
-              <a:buSzTx/>
-              <a:buFontTx/>
-              <a:buNone/>
-              <a:tabLst/>
-              <a:defRPr/>
-            </a:pPr>
-            <a:r>
-              <a:rPr kumimoji="0" lang="es-CL" sz="6600" i="0" u="none" strike="noStrike" kern="1200" cap="none" spc="-300" normalizeH="0" baseline="0" noProof="0" dirty="0" smtClean="0">
-                <a:ln>
-                  <a:noFill/>
-                </a:ln>
+          <a:effectLst/>
+          <a:extLst>
+            <a:ext uri="{909E8E84-426E-40DD-AFC4-6F175D3DCCD1}">
+              <a14:hiddenFill xmlns="" xmlns:a14="http://schemas.microsoft.com/office/drawing/2010/main">
                 <a:solidFill>
-                  <a:srgbClr val="311ABC"/>
+                  <a:schemeClr val="accent1"/>
                 </a:solidFill>
+              </a14:hiddenFill>
+            </a:ext>
+            <a:ext uri="{91240B29-F687-4F45-9708-019B960494DF}">
+              <a14:hiddenLine xmlns="" xmlns:a14="http://schemas.microsoft.com/office/drawing/2010/main" w="9525">
+                <a:solidFill>
+                  <a:schemeClr val="tx1"/>
+                </a:solidFill>
+                <a:miter lim="800000"/>
+                <a:headEnd/>
+                <a:tailEnd/>
+              </a14:hiddenLine>
+            </a:ext>
+            <a:ext uri="{AF507438-7753-43E0-B8FC-AC1667EBCBE1}">
+              <a14:hiddenEffects xmlns="" xmlns:a14="http://schemas.microsoft.com/office/drawing/2010/main">
                 <a:effectLst>
-                  <a:outerShdw blurRad="38100" dist="38100" dir="2700000" algn="tl">
-                    <a:srgbClr val="000000">
-                      <a:alpha val="43137"/>
-                    </a:srgbClr>
+                  <a:outerShdw dist="35921" dir="2700000" algn="ctr" rotWithShape="0">
+                    <a:schemeClr val="bg2"/>
                   </a:outerShdw>
                 </a:effectLst>
-                <a:uLnTx/>
-                <a:uFillTx/>
-                <a:latin typeface="Bauhaus 93" pitchFamily="82" charset="0"/>
-                <a:ea typeface="+mj-ea"/>
-                <a:cs typeface="Arial" pitchFamily="34" charset="0"/>
-              </a:rPr>
-              <a:t>BLOOCRU</a:t>
-            </a:r>
-            <a:endParaRPr kumimoji="0" lang="es-CL" sz="5400" i="0" u="none" strike="noStrike" kern="1200" cap="none" spc="-300" normalizeH="0" baseline="0" noProof="0" dirty="0" smtClean="0">
-              <a:ln>
-                <a:noFill/>
-              </a:ln>
-              <a:solidFill>
-                <a:srgbClr val="311ABC"/>
-              </a:solidFill>
-              <a:effectLst>
-                <a:outerShdw blurRad="38100" dist="38100" dir="2700000" algn="tl">
-                  <a:srgbClr val="000000">
-                    <a:alpha val="43137"/>
-                  </a:srgbClr>
-                </a:outerShdw>
-              </a:effectLst>
-              <a:uLnTx/>
-              <a:uFillTx/>
-              <a:latin typeface="Bauhaus 93" pitchFamily="82" charset="0"/>
-              <a:ea typeface="+mj-ea"/>
-              <a:cs typeface="Arial" pitchFamily="34" charset="0"/>
-            </a:endParaRPr>
-          </a:p>
-        </p:txBody>
-      </p:sp>
-      <p:sp>
-        <p:nvSpPr>
-          <p:cNvPr id="24" name="5-Point Star 23"/>
-          <p:cNvSpPr/>
-          <p:nvPr/>
-        </p:nvSpPr>
-        <p:spPr>
-          <a:xfrm>
-            <a:off x="4929190" y="4779972"/>
-            <a:ext cx="928694" cy="928694"/>
-          </a:xfrm>
-          <a:prstGeom prst="star5">
-            <a:avLst/>
-          </a:prstGeom>
-          <a:solidFill>
-            <a:srgbClr val="F92913"/>
-          </a:solidFill>
-          <a:ln w="38100">
-            <a:solidFill>
-              <a:schemeClr val="bg1"/>
-            </a:solidFill>
-          </a:ln>
+              </a14:hiddenEffects>
+            </a:ext>
+          </a:extLst>
         </p:spPr>
-        <p:style>
-          <a:lnRef idx="2">
-            <a:schemeClr val="accent1">
-              <a:shade val="50000"/>
-            </a:schemeClr>
-          </a:lnRef>
-          <a:fillRef idx="1">
-            <a:schemeClr val="accent1"/>
-          </a:fillRef>
-          <a:effectRef idx="0">
-            <a:schemeClr val="accent1"/>
-          </a:effectRef>
-          <a:fontRef idx="minor">
-            <a:schemeClr val="lt1"/>
-          </a:fontRef>
-        </p:style>
-        <p:txBody>
-          <a:bodyPr rtlCol="0" anchor="ctr"/>
-          <a:lstStyle/>
-          <a:p>
-            <a:pPr algn="ctr"/>
-            <a:endParaRPr lang="es-CL"/>
-          </a:p>
-        </p:txBody>
-      </p:sp>
+      </p:pic>
     </p:spTree>
+    <p:extLst>
+      <p:ext uri="{BB962C8B-B14F-4D97-AF65-F5344CB8AC3E}">
+        <p14:creationId xmlns="" xmlns:p14="http://schemas.microsoft.com/office/powerpoint/2010/main" val="3536648175"/>
+      </p:ext>
+    </p:extLst>
   </p:cSld>
   <p:clrMapOvr>
     <a:masterClrMapping/>
   </p:clrMapOvr>
+  <p:timing>
+    <p:tnLst>
+      <p:par>
+        <p:cTn id="1" dur="indefinite" restart="never" nodeType="tmRoot"/>
+      </p:par>
+    </p:tnLst>
+  </p:timing>
 </p:sld>
 </file>
 
 <file path=ppt/theme/theme1.xml><?xml version="1.0" encoding="utf-8"?>
-<a:theme xmlns:a="http://schemas.openxmlformats.org/drawingml/2006/main" name="Office Theme">
+<a:theme xmlns:a="http://schemas.openxmlformats.org/drawingml/2006/main" name="Tema de Office">
   <a:themeElements>
     <a:clrScheme name="Office">
       <a:dk1>

</xml_diff>